<commit_message>
99 percento esportazione fatta
</commit_message>
<xml_diff>
--- a/backend/data/exports/asasaNOME UNITÀ_scheda.pptx
+++ b/backend/data/exports/asasaNOME UNITÀ_scheda.pptx
@@ -7,7 +7,7 @@
   <p:sldIdLst>
     <p:sldId id="256" r:id="rId7"/>
   </p:sldIdLst>
-  <p:sldSz cx="10696575" cy="7562850" type="screen4x3"/>
+  <p:sldSz cx="8557260" cy="6050280" type="screen4x3"/>
   <p:notesSz cx="6858000" cy="9144000"/>
   <p:defaultTextStyle>
     <a:defPPr>
@@ -3165,7 +3165,7 @@
       </p:pic>
       <p:pic>
         <p:nvPicPr>
-          <p:cNvPr id="4" name="Picture 3" descr="tmppg72t4z8.png"/>
+          <p:cNvPr id="4" name="Picture 3" descr="download_5928cc62089848be8f95b133106e1e0c.png"/>
           <p:cNvPicPr>
             <a:picLocks noChangeAspect="1"/>
           </p:cNvPicPr>
@@ -3257,34 +3257,30 @@
           </a:p>
         </p:txBody>
       </p:sp>
-      <p:sp>
-        <p:nvSpPr>
-          <p:cNvPr id="7" name="TextBox 6"/>
-          <p:cNvSpPr txBox="1"/>
+      <p:pic>
+        <p:nvPicPr>
+          <p:cNvPr id="7" name="Picture 6" descr="4322125b-624e-4cf6-b1ce-7a4ecfa0e24b.png"/>
+          <p:cNvPicPr>
+            <a:picLocks noChangeAspect="1"/>
+          </p:cNvPicPr>
           <p:nvPr/>
-        </p:nvSpPr>
+        </p:nvPicPr>
+        <p:blipFill>
+          <a:blip r:embed="rId4"/>
+          <a:stretch>
+            <a:fillRect/>
+          </a:stretch>
+        </p:blipFill>
         <p:spPr>
           <a:xfrm>
-            <a:off x="476250" y="1428750"/>
-            <a:ext cx="11239500" cy="2857500"/>
+            <a:off x="3556000" y="1428750"/>
+            <a:ext cx="5080000" cy="2857500"/>
           </a:xfrm>
           <a:prstGeom prst="rect">
             <a:avLst/>
           </a:prstGeom>
-          <a:noFill/>
         </p:spPr>
-        <p:txBody>
-          <a:bodyPr wrap="none">
-            <a:spAutoFit/>
-          </a:bodyPr>
-          <a:lstStyle/>
-          <a:p>
-            <a:r>
-              <a:t>[SILHOUETTE]</a:t>
-            </a:r>
-          </a:p>
-        </p:txBody>
-      </p:sp>
+      </p:pic>
       <p:graphicFrame>
         <p:nvGraphicFramePr>
           <p:cNvPr id="8" name="Table 7"/>

</xml_diff>